<commit_message>
update lesson 7 and lesson plans
</commit_message>
<xml_diff>
--- a/resources/hw/genomic-data-visualization-HW_4.pptx
+++ b/resources/hw/genomic-data-visualization-HW_4.pptx
@@ -3377,7 +3377,7 @@
           <a:p>
             <a:r>
               <a:rPr lang="en-US" dirty="0"/>
-              <a:t>Due Thursday (Midnight Baltimore Time)</a:t>
+              <a:t>Due Friday (Midnight Baltimore Time)</a:t>
             </a:r>
           </a:p>
         </p:txBody>
@@ -3859,7 +3859,10 @@
           </a:bodyPr>
           <a:lstStyle/>
           <a:p>
-            <a:endParaRPr lang="en-US" sz="2200" dirty="0"/>
+            <a:pPr marL="457200" lvl="1" indent="0">
+              <a:buNone/>
+            </a:pPr>
+            <a:endParaRPr lang="en-US" sz="1800" dirty="0"/>
           </a:p>
           <a:p>
             <a:r>
@@ -3925,6 +3928,45 @@
               <a:t>bulbasaur</a:t>
             </a:r>
             <a:endParaRPr lang="en-US" sz="2200" dirty="0"/>
+          </a:p>
+        </p:txBody>
+      </p:sp>
+      <p:sp>
+        <p:nvSpPr>
+          <p:cNvPr id="5" name="TextBox 4">
+            <a:extLst>
+              <a:ext uri="{FF2B5EF4-FFF2-40B4-BE49-F238E27FC236}">
+                <a16:creationId xmlns:a16="http://schemas.microsoft.com/office/drawing/2014/main" id="{93F6CA7C-54AD-4D35-EA79-348A06F1955A}"/>
+              </a:ext>
+            </a:extLst>
+          </p:cNvPr>
+          <p:cNvSpPr txBox="1"/>
+          <p:nvPr/>
+        </p:nvSpPr>
+        <p:spPr>
+          <a:xfrm>
+            <a:off x="1108038" y="5724939"/>
+            <a:ext cx="1726498" cy="369332"/>
+          </a:xfrm>
+          <a:prstGeom prst="rect">
+            <a:avLst/>
+          </a:prstGeom>
+          <a:noFill/>
+        </p:spPr>
+        <p:txBody>
+          <a:bodyPr wrap="none" rtlCol="0">
+            <a:spAutoFit/>
+          </a:bodyPr>
+          <a:lstStyle/>
+          <a:p>
+            <a:r>
+              <a:rPr lang="en-US" b="1" dirty="0" err="1"/>
+              <a:t>Bit.ly</a:t>
+            </a:r>
+            <a:r>
+              <a:rPr lang="en-US" b="1" dirty="0"/>
+              <a:t>/GDV23_rc</a:t>
+            </a:r>
           </a:p>
         </p:txBody>
       </p:sp>

</xml_diff>